<commit_message>
name changing of buttons
</commit_message>
<xml_diff>
--- a/PROJ-216-Dundas-Smith, Saito, Sagnia, Sharpe - Travel Experts Presentation.pptx
+++ b/PROJ-216-Dundas-Smith, Saito, Sagnia, Sharpe - Travel Experts Presentation.pptx
@@ -349,7 +349,7 @@
           <a:p>
             <a:fld id="{43E53CEF-662E-4EFE-A72F-D875F4B0FAA4}" type="datetimeFigureOut">
               <a:rPr lang="en-US" smtClean="0"/>
-              <a:t>4/24/2019</a:t>
+              <a:t>4/25/2019</a:t>
             </a:fld>
             <a:endParaRPr lang="en-US"/>
           </a:p>
@@ -1419,7 +1419,7 @@
           <a:p>
             <a:fld id="{48A87A34-81AB-432B-8DAE-1953F412C126}" type="datetimeFigureOut">
               <a:rPr lang="en-US" smtClean="0"/>
-              <a:t>4/24/2019</a:t>
+              <a:t>4/25/2019</a:t>
             </a:fld>
             <a:endParaRPr lang="en-US"/>
           </a:p>
@@ -1855,7 +1855,7 @@
           <a:p>
             <a:fld id="{48A87A34-81AB-432B-8DAE-1953F412C126}" type="datetimeFigureOut">
               <a:rPr lang="en-US" smtClean="0"/>
-              <a:t>4/24/2019</a:t>
+              <a:t>4/25/2019</a:t>
             </a:fld>
             <a:endParaRPr lang="en-US"/>
           </a:p>
@@ -2106,7 +2106,7 @@
             <a:fld id="{48A87A34-81AB-432B-8DAE-1953F412C126}" type="datetimeFigureOut">
               <a:rPr lang="en-US" smtClean="0"/>
               <a:pPr/>
-              <a:t>4/24/2019</a:t>
+              <a:t>4/25/2019</a:t>
             </a:fld>
             <a:endParaRPr lang="en-US"/>
           </a:p>
@@ -2415,7 +2415,7 @@
             <a:fld id="{48A87A34-81AB-432B-8DAE-1953F412C126}" type="datetimeFigureOut">
               <a:rPr lang="en-US" smtClean="0"/>
               <a:pPr/>
-              <a:t>4/24/2019</a:t>
+              <a:t>4/25/2019</a:t>
             </a:fld>
             <a:endParaRPr lang="en-US"/>
           </a:p>
@@ -2734,7 +2734,7 @@
             <a:fld id="{48A87A34-81AB-432B-8DAE-1953F412C126}" type="datetimeFigureOut">
               <a:rPr lang="en-US" smtClean="0"/>
               <a:pPr/>
-              <a:t>4/24/2019</a:t>
+              <a:t>4/25/2019</a:t>
             </a:fld>
             <a:endParaRPr lang="en-US"/>
           </a:p>
@@ -3037,7 +3037,7 @@
             <a:fld id="{48A87A34-81AB-432B-8DAE-1953F412C126}" type="datetimeFigureOut">
               <a:rPr lang="en-US" smtClean="0"/>
               <a:pPr/>
-              <a:t>4/24/2019</a:t>
+              <a:t>4/25/2019</a:t>
             </a:fld>
             <a:endParaRPr lang="en-US"/>
           </a:p>
@@ -3406,7 +3406,7 @@
             <a:fld id="{48A87A34-81AB-432B-8DAE-1953F412C126}" type="datetimeFigureOut">
               <a:rPr lang="en-US" smtClean="0"/>
               <a:pPr/>
-              <a:t>4/24/2019</a:t>
+              <a:t>4/25/2019</a:t>
             </a:fld>
             <a:endParaRPr lang="en-US"/>
           </a:p>
@@ -3581,7 +3581,7 @@
           <a:p>
             <a:fld id="{48A87A34-81AB-432B-8DAE-1953F412C126}" type="datetimeFigureOut">
               <a:rPr lang="en-US" smtClean="0"/>
-              <a:t>4/24/2019</a:t>
+              <a:t>4/25/2019</a:t>
             </a:fld>
             <a:endParaRPr lang="en-US"/>
           </a:p>
@@ -3762,7 +3762,7 @@
             <a:fld id="{48A87A34-81AB-432B-8DAE-1953F412C126}" type="datetimeFigureOut">
               <a:rPr lang="en-US" smtClean="0"/>
               <a:pPr/>
-              <a:t>4/24/2019</a:t>
+              <a:t>4/25/2019</a:t>
             </a:fld>
             <a:endParaRPr lang="en-US"/>
           </a:p>
@@ -3932,7 +3932,7 @@
           <a:p>
             <a:fld id="{48A87A34-81AB-432B-8DAE-1953F412C126}" type="datetimeFigureOut">
               <a:rPr lang="en-US" smtClean="0"/>
-              <a:t>4/24/2019</a:t>
+              <a:t>4/25/2019</a:t>
             </a:fld>
             <a:endParaRPr lang="en-US"/>
           </a:p>
@@ -4183,7 +4183,7 @@
             <a:fld id="{48A87A34-81AB-432B-8DAE-1953F412C126}" type="datetimeFigureOut">
               <a:rPr lang="en-US" smtClean="0"/>
               <a:pPr/>
-              <a:t>4/24/2019</a:t>
+              <a:t>4/25/2019</a:t>
             </a:fld>
             <a:endParaRPr lang="en-US"/>
           </a:p>
@@ -4419,7 +4419,7 @@
           <a:p>
             <a:fld id="{48A87A34-81AB-432B-8DAE-1953F412C126}" type="datetimeFigureOut">
               <a:rPr lang="en-US" smtClean="0"/>
-              <a:t>4/24/2019</a:t>
+              <a:t>4/25/2019</a:t>
             </a:fld>
             <a:endParaRPr lang="en-US"/>
           </a:p>
@@ -4801,7 +4801,7 @@
           <a:p>
             <a:fld id="{48A87A34-81AB-432B-8DAE-1953F412C126}" type="datetimeFigureOut">
               <a:rPr lang="en-US" smtClean="0"/>
-              <a:t>4/24/2019</a:t>
+              <a:t>4/25/2019</a:t>
             </a:fld>
             <a:endParaRPr lang="en-US"/>
           </a:p>
@@ -4919,7 +4919,7 @@
           <a:p>
             <a:fld id="{48A87A34-81AB-432B-8DAE-1953F412C126}" type="datetimeFigureOut">
               <a:rPr lang="en-US" smtClean="0"/>
-              <a:t>4/24/2019</a:t>
+              <a:t>4/25/2019</a:t>
             </a:fld>
             <a:endParaRPr lang="en-US"/>
           </a:p>
@@ -5014,7 +5014,7 @@
           <a:p>
             <a:fld id="{48A87A34-81AB-432B-8DAE-1953F412C126}" type="datetimeFigureOut">
               <a:rPr lang="en-US" smtClean="0"/>
-              <a:t>4/24/2019</a:t>
+              <a:t>4/25/2019</a:t>
             </a:fld>
             <a:endParaRPr lang="en-US"/>
           </a:p>
@@ -5269,7 +5269,7 @@
           <a:p>
             <a:fld id="{48A87A34-81AB-432B-8DAE-1953F412C126}" type="datetimeFigureOut">
               <a:rPr lang="en-US" smtClean="0"/>
-              <a:t>4/24/2019</a:t>
+              <a:t>4/25/2019</a:t>
             </a:fld>
             <a:endParaRPr lang="en-US"/>
           </a:p>
@@ -5552,7 +5552,7 @@
           <a:p>
             <a:fld id="{48A87A34-81AB-432B-8DAE-1953F412C126}" type="datetimeFigureOut">
               <a:rPr lang="en-US" smtClean="0"/>
-              <a:t>4/24/2019</a:t>
+              <a:t>4/25/2019</a:t>
             </a:fld>
             <a:endParaRPr lang="en-US"/>
           </a:p>
@@ -5959,7 +5959,7 @@
             <a:fld id="{48A87A34-81AB-432B-8DAE-1953F412C126}" type="datetimeFigureOut">
               <a:rPr lang="en-US" smtClean="0"/>
               <a:pPr/>
-              <a:t>4/24/2019</a:t>
+              <a:t>4/25/2019</a:t>
             </a:fld>
             <a:endParaRPr lang="en-US"/>
           </a:p>
@@ -6651,23 +6651,7 @@
                   <a:schemeClr val="bg1"/>
                 </a:solidFill>
               </a:rPr>
-              <a:t>Cost Breakdown </a:t>
-            </a:r>
-            <a:r>
-              <a:rPr lang="en-US" dirty="0" smtClean="0">
-                <a:solidFill>
-                  <a:schemeClr val="bg1"/>
-                </a:solidFill>
-              </a:rPr>
-              <a:t>and </a:t>
-            </a:r>
-            <a:r>
-              <a:rPr lang="en-US" dirty="0" smtClean="0">
-                <a:solidFill>
-                  <a:schemeClr val="bg1"/>
-                </a:solidFill>
-              </a:rPr>
-              <a:t>Schedule</a:t>
+              <a:t>Cost Breakdown and Schedule</a:t>
             </a:r>
             <a:endParaRPr lang="en-US" dirty="0">
               <a:solidFill>
@@ -7064,7 +7048,39 @@
                   <a:schemeClr val="bg1"/>
                 </a:solidFill>
               </a:rPr>
-              <a:t>Build a Agent JAVA based Desktop App</a:t>
+              <a:t>Build </a:t>
+            </a:r>
+            <a:r>
+              <a:rPr lang="en-US" dirty="0" smtClean="0">
+                <a:solidFill>
+                  <a:schemeClr val="bg1"/>
+                </a:solidFill>
+              </a:rPr>
+              <a:t>a </a:t>
+            </a:r>
+            <a:r>
+              <a:rPr lang="en-US" dirty="0" smtClean="0">
+                <a:solidFill>
+                  <a:schemeClr val="bg1"/>
+                </a:solidFill>
+              </a:rPr>
+              <a:t>JAVA </a:t>
+            </a:r>
+            <a:r>
+              <a:rPr lang="en-US" dirty="0" smtClean="0">
+                <a:solidFill>
+                  <a:schemeClr val="bg1"/>
+                </a:solidFill>
+              </a:rPr>
+              <a:t>based Agents </a:t>
+            </a:r>
+            <a:r>
+              <a:rPr lang="en-US" dirty="0" smtClean="0">
+                <a:solidFill>
+                  <a:schemeClr val="bg1"/>
+                </a:solidFill>
+              </a:rPr>
+              <a:t>Desktop App</a:t>
             </a:r>
             <a:endParaRPr lang="en-US" dirty="0">
               <a:solidFill>
@@ -7438,11 +7454,7 @@
             </a:r>
             <a:r>
               <a:rPr lang="en-US" sz="6000" dirty="0" smtClean="0"/>
-              <a:t>App</a:t>
-            </a:r>
-            <a:r>
-              <a:rPr lang="en-US" sz="6000" dirty="0" smtClean="0"/>
-              <a:t> </a:t>
+              <a:t>App </a:t>
             </a:r>
             <a:r>
               <a:rPr lang="en-US" sz="6000" dirty="0"/>

</xml_diff>